<commit_message>
Update game's new features to README.md
</commit_message>
<xml_diff>
--- a/out/production/Frogger/img/helpPageCom/helps.pptx
+++ b/out/production/Frogger/img/helpPageCom/helps.pptx
@@ -264,7 +264,7 @@
           <a:p>
             <a:fld id="{27A8BBC6-B223-4696-8C66-075B2B7EAE16}" type="datetimeFigureOut">
               <a:rPr lang="en-GB" smtClean="0"/>
-              <a:t>01/12/2019</a:t>
+              <a:t>13/12/2019</a:t>
             </a:fld>
             <a:endParaRPr lang="en-GB"/>
           </a:p>
@@ -464,7 +464,7 @@
           <a:p>
             <a:fld id="{27A8BBC6-B223-4696-8C66-075B2B7EAE16}" type="datetimeFigureOut">
               <a:rPr lang="en-GB" smtClean="0"/>
-              <a:t>01/12/2019</a:t>
+              <a:t>13/12/2019</a:t>
             </a:fld>
             <a:endParaRPr lang="en-GB"/>
           </a:p>
@@ -674,7 +674,7 @@
           <a:p>
             <a:fld id="{27A8BBC6-B223-4696-8C66-075B2B7EAE16}" type="datetimeFigureOut">
               <a:rPr lang="en-GB" smtClean="0"/>
-              <a:t>01/12/2019</a:t>
+              <a:t>13/12/2019</a:t>
             </a:fld>
             <a:endParaRPr lang="en-GB"/>
           </a:p>
@@ -874,7 +874,7 @@
           <a:p>
             <a:fld id="{27A8BBC6-B223-4696-8C66-075B2B7EAE16}" type="datetimeFigureOut">
               <a:rPr lang="en-GB" smtClean="0"/>
-              <a:t>01/12/2019</a:t>
+              <a:t>13/12/2019</a:t>
             </a:fld>
             <a:endParaRPr lang="en-GB"/>
           </a:p>
@@ -1150,7 +1150,7 @@
           <a:p>
             <a:fld id="{27A8BBC6-B223-4696-8C66-075B2B7EAE16}" type="datetimeFigureOut">
               <a:rPr lang="en-GB" smtClean="0"/>
-              <a:t>01/12/2019</a:t>
+              <a:t>13/12/2019</a:t>
             </a:fld>
             <a:endParaRPr lang="en-GB"/>
           </a:p>
@@ -1418,7 +1418,7 @@
           <a:p>
             <a:fld id="{27A8BBC6-B223-4696-8C66-075B2B7EAE16}" type="datetimeFigureOut">
               <a:rPr lang="en-GB" smtClean="0"/>
-              <a:t>01/12/2019</a:t>
+              <a:t>13/12/2019</a:t>
             </a:fld>
             <a:endParaRPr lang="en-GB"/>
           </a:p>
@@ -1833,7 +1833,7 @@
           <a:p>
             <a:fld id="{27A8BBC6-B223-4696-8C66-075B2B7EAE16}" type="datetimeFigureOut">
               <a:rPr lang="en-GB" smtClean="0"/>
-              <a:t>01/12/2019</a:t>
+              <a:t>13/12/2019</a:t>
             </a:fld>
             <a:endParaRPr lang="en-GB"/>
           </a:p>
@@ -1975,7 +1975,7 @@
           <a:p>
             <a:fld id="{27A8BBC6-B223-4696-8C66-075B2B7EAE16}" type="datetimeFigureOut">
               <a:rPr lang="en-GB" smtClean="0"/>
-              <a:t>01/12/2019</a:t>
+              <a:t>13/12/2019</a:t>
             </a:fld>
             <a:endParaRPr lang="en-GB"/>
           </a:p>
@@ -2088,7 +2088,7 @@
           <a:p>
             <a:fld id="{27A8BBC6-B223-4696-8C66-075B2B7EAE16}" type="datetimeFigureOut">
               <a:rPr lang="en-GB" smtClean="0"/>
-              <a:t>01/12/2019</a:t>
+              <a:t>13/12/2019</a:t>
             </a:fld>
             <a:endParaRPr lang="en-GB"/>
           </a:p>
@@ -2401,7 +2401,7 @@
           <a:p>
             <a:fld id="{27A8BBC6-B223-4696-8C66-075B2B7EAE16}" type="datetimeFigureOut">
               <a:rPr lang="en-GB" smtClean="0"/>
-              <a:t>01/12/2019</a:t>
+              <a:t>13/12/2019</a:t>
             </a:fld>
             <a:endParaRPr lang="en-GB"/>
           </a:p>
@@ -2690,7 +2690,7 @@
           <a:p>
             <a:fld id="{27A8BBC6-B223-4696-8C66-075B2B7EAE16}" type="datetimeFigureOut">
               <a:rPr lang="en-GB" smtClean="0"/>
-              <a:t>01/12/2019</a:t>
+              <a:t>13/12/2019</a:t>
             </a:fld>
             <a:endParaRPr lang="en-GB"/>
           </a:p>
@@ -2933,7 +2933,7 @@
           <a:p>
             <a:fld id="{27A8BBC6-B223-4696-8C66-075B2B7EAE16}" type="datetimeFigureOut">
               <a:rPr lang="en-GB" smtClean="0"/>
-              <a:t>01/12/2019</a:t>
+              <a:t>13/12/2019</a:t>
             </a:fld>
             <a:endParaRPr lang="en-GB"/>
           </a:p>
@@ -3350,12 +3350,114 @@
           <a:chExt cx="0" cy="0"/>
         </a:xfrm>
       </p:grpSpPr>
+      <p:sp>
+        <p:nvSpPr>
+          <p:cNvPr id="4" name="Rectangle 3">
+            <a:extLst>
+              <a:ext uri="{FF2B5EF4-FFF2-40B4-BE49-F238E27FC236}">
+                <a16:creationId xmlns:a16="http://schemas.microsoft.com/office/drawing/2014/main" id="{E4B290F4-E4C8-4330-A009-0649E5A01C84}"/>
+              </a:ext>
+            </a:extLst>
+          </p:cNvPr>
+          <p:cNvSpPr/>
+          <p:nvPr/>
+        </p:nvSpPr>
+        <p:spPr>
+          <a:xfrm>
+            <a:off x="0" y="0"/>
+            <a:ext cx="12192000" cy="6858000"/>
+          </a:xfrm>
+          <a:prstGeom prst="rect">
+            <a:avLst/>
+          </a:prstGeom>
+        </p:spPr>
+        <p:style>
+          <a:lnRef idx="2">
+            <a:schemeClr val="dk1">
+              <a:shade val="50000"/>
+            </a:schemeClr>
+          </a:lnRef>
+          <a:fillRef idx="1">
+            <a:schemeClr val="dk1"/>
+          </a:fillRef>
+          <a:effectRef idx="0">
+            <a:schemeClr val="dk1"/>
+          </a:effectRef>
+          <a:fontRef idx="minor">
+            <a:schemeClr val="lt1"/>
+          </a:fontRef>
+        </p:style>
+        <p:txBody>
+          <a:bodyPr rtlCol="0" anchor="ctr"/>
+          <a:lstStyle/>
+          <a:p>
+            <a:pPr algn="ctr"/>
+            <a:endParaRPr lang="en-GB"/>
+          </a:p>
+        </p:txBody>
+      </p:sp>
+      <p:sp>
+        <p:nvSpPr>
+          <p:cNvPr id="8" name="TextBox 7">
+            <a:extLst>
+              <a:ext uri="{FF2B5EF4-FFF2-40B4-BE49-F238E27FC236}">
+                <a16:creationId xmlns:a16="http://schemas.microsoft.com/office/drawing/2014/main" id="{40910F60-31F5-44C9-8A18-6E281B7648CB}"/>
+              </a:ext>
+            </a:extLst>
+          </p:cNvPr>
+          <p:cNvSpPr txBox="1"/>
+          <p:nvPr/>
+        </p:nvSpPr>
+        <p:spPr>
+          <a:xfrm>
+            <a:off x="1606302" y="89972"/>
+            <a:ext cx="2221808" cy="2062103"/>
+          </a:xfrm>
+          <a:prstGeom prst="rect">
+            <a:avLst/>
+          </a:prstGeom>
+          <a:noFill/>
+        </p:spPr>
+        <p:txBody>
+          <a:bodyPr wrap="square" rtlCol="0">
+            <a:spAutoFit/>
+          </a:bodyPr>
+          <a:lstStyle/>
+          <a:p>
+            <a:r>
+              <a:rPr lang="en-GB" sz="1600" dirty="0">
+                <a:solidFill>
+                  <a:schemeClr val="bg1"/>
+                </a:solidFill>
+              </a:rPr>
+              <a:t>The frog in this game could be manipulated by using “W”, “A”, “S” and “D” on your key board. </a:t>
+            </a:r>
+          </a:p>
+          <a:p>
+            <a:endParaRPr lang="en-GB" sz="1600" dirty="0">
+              <a:solidFill>
+                <a:schemeClr val="bg1"/>
+              </a:solidFill>
+            </a:endParaRPr>
+          </a:p>
+          <a:p>
+            <a:r>
+              <a:rPr lang="en-GB" sz="1600" dirty="0">
+                <a:solidFill>
+                  <a:schemeClr val="bg1"/>
+                </a:solidFill>
+              </a:rPr>
+              <a:t>You could press space to pause game during playing.</a:t>
+            </a:r>
+          </a:p>
+        </p:txBody>
+      </p:sp>
       <p:pic>
         <p:nvPicPr>
-          <p:cNvPr id="7" name="Picture 6">
-            <a:extLst>
-              <a:ext uri="{FF2B5EF4-FFF2-40B4-BE49-F238E27FC236}">
-                <a16:creationId xmlns:a16="http://schemas.microsoft.com/office/drawing/2014/main" id="{F80B79CA-0FAF-4EFF-975E-51C105249037}"/>
+          <p:cNvPr id="3" name="Picture 2">
+            <a:extLst>
+              <a:ext uri="{FF2B5EF4-FFF2-40B4-BE49-F238E27FC236}">
+                <a16:creationId xmlns:a16="http://schemas.microsoft.com/office/drawing/2014/main" id="{629C1E98-42D3-45B0-9257-81B8F064F70E}"/>
               </a:ext>
             </a:extLst>
           </p:cNvPr>
@@ -3378,53 +3480,50 @@
         </p:blipFill>
         <p:spPr>
           <a:xfrm>
-            <a:off x="0" y="0"/>
-            <a:ext cx="12191999" cy="6857999"/>
+            <a:off x="180940" y="1439441"/>
+            <a:ext cx="1244422" cy="447375"/>
           </a:xfrm>
           <a:prstGeom prst="rect">
             <a:avLst/>
           </a:prstGeom>
         </p:spPr>
       </p:pic>
-      <p:sp>
-        <p:nvSpPr>
-          <p:cNvPr id="8" name="TextBox 7">
-            <a:extLst>
-              <a:ext uri="{FF2B5EF4-FFF2-40B4-BE49-F238E27FC236}">
-                <a16:creationId xmlns:a16="http://schemas.microsoft.com/office/drawing/2014/main" id="{40910F60-31F5-44C9-8A18-6E281B7648CB}"/>
-              </a:ext>
-            </a:extLst>
-          </p:cNvPr>
-          <p:cNvSpPr txBox="1"/>
+      <p:pic>
+        <p:nvPicPr>
+          <p:cNvPr id="6" name="Picture 5">
+            <a:extLst>
+              <a:ext uri="{FF2B5EF4-FFF2-40B4-BE49-F238E27FC236}">
+                <a16:creationId xmlns:a16="http://schemas.microsoft.com/office/drawing/2014/main" id="{1EFB5349-CD48-40EF-B186-FFB51D06784D}"/>
+              </a:ext>
+            </a:extLst>
+          </p:cNvPr>
+          <p:cNvPicPr>
+            <a:picLocks noChangeAspect="1"/>
+          </p:cNvPicPr>
           <p:nvPr/>
-        </p:nvSpPr>
-        <p:spPr>
-          <a:xfrm>
-            <a:off x="246184" y="1705707"/>
-            <a:ext cx="2942493" cy="2031325"/>
+        </p:nvPicPr>
+        <p:blipFill>
+          <a:blip r:embed="rId3">
+            <a:extLst>
+              <a:ext uri="{28A0092B-C50C-407E-A947-70E740481C1C}">
+                <a14:useLocalDpi xmlns:a14="http://schemas.microsoft.com/office/drawing/2010/main" val="0"/>
+              </a:ext>
+            </a:extLst>
+          </a:blip>
+          <a:stretch>
+            <a:fillRect/>
+          </a:stretch>
+        </p:blipFill>
+        <p:spPr>
+          <a:xfrm>
+            <a:off x="173668" y="217248"/>
+            <a:ext cx="1251694" cy="827391"/>
           </a:xfrm>
           <a:prstGeom prst="rect">
             <a:avLst/>
           </a:prstGeom>
-          <a:noFill/>
-        </p:spPr>
-        <p:txBody>
-          <a:bodyPr wrap="square" rtlCol="0">
-            <a:spAutoFit/>
-          </a:bodyPr>
-          <a:lstStyle/>
-          <a:p>
-            <a:r>
-              <a:rPr lang="en-GB" dirty="0">
-                <a:solidFill>
-                  <a:schemeClr val="bg1"/>
-                </a:solidFill>
-              </a:rPr>
-              <a:t>The frog in this game could be manipulated by using “W”, “A”, “S” and “D” on your key board. You could press two keys together, however your frog with only moves in one direction.</a:t>
-            </a:r>
-          </a:p>
-        </p:txBody>
-      </p:sp>
+        </p:spPr>
+      </p:pic>
     </p:spTree>
     <p:extLst>
       <p:ext uri="{BB962C8B-B14F-4D97-AF65-F5344CB8AC3E}">
@@ -3537,7 +3636,7 @@
         </p:blipFill>
         <p:spPr>
           <a:xfrm>
-            <a:off x="710712" y="86687"/>
+            <a:off x="242814" y="213244"/>
             <a:ext cx="959826" cy="650729"/>
           </a:xfrm>
           <a:prstGeom prst="rect">
@@ -3573,8 +3672,8 @@
         </p:blipFill>
         <p:spPr>
           <a:xfrm>
-            <a:off x="408659" y="1961342"/>
-            <a:ext cx="1563932" cy="506366"/>
+            <a:off x="136280" y="1426836"/>
+            <a:ext cx="1309172" cy="423880"/>
           </a:xfrm>
           <a:prstGeom prst="rect">
             <a:avLst/>
@@ -3595,8 +3694,8 @@
         </p:nvSpPr>
         <p:spPr>
           <a:xfrm>
-            <a:off x="136282" y="771449"/>
-            <a:ext cx="2108687" cy="1200329"/>
+            <a:off x="1445454" y="22949"/>
+            <a:ext cx="1912998" cy="1077218"/>
           </a:xfrm>
           <a:prstGeom prst="rect">
             <a:avLst/>
@@ -3611,7 +3710,7 @@
           <a:p>
             <a:pPr algn="ctr"/>
             <a:r>
-              <a:rPr lang="en-GB" dirty="0">
+              <a:rPr lang="en-GB" sz="1600" dirty="0">
                 <a:solidFill>
                   <a:schemeClr val="bg1"/>
                 </a:solidFill>
@@ -3622,12 +3721,12 @@
           <a:p>
             <a:pPr algn="ctr"/>
             <a:r>
-              <a:rPr lang="en-GB" dirty="0">
+              <a:rPr lang="en-GB" sz="1600" dirty="0">
                 <a:solidFill>
                   <a:schemeClr val="bg1"/>
                 </a:solidFill>
               </a:rPr>
-              <a:t>One kind of moving obstacles, could move fast.</a:t>
+              <a:t>One kind of moving obstacle, could move fast.</a:t>
             </a:r>
           </a:p>
         </p:txBody>
@@ -3646,8 +3745,8 @@
         </p:nvSpPr>
         <p:spPr>
           <a:xfrm>
-            <a:off x="136282" y="2467708"/>
-            <a:ext cx="2161441" cy="1200329"/>
+            <a:off x="1445453" y="1100167"/>
+            <a:ext cx="2161441" cy="1077218"/>
           </a:xfrm>
           <a:prstGeom prst="rect">
             <a:avLst/>
@@ -3662,7 +3761,7 @@
           <a:p>
             <a:pPr algn="ctr"/>
             <a:r>
-              <a:rPr lang="en-GB" dirty="0">
+              <a:rPr lang="en-GB" sz="1600" dirty="0">
                 <a:solidFill>
                   <a:schemeClr val="bg1"/>
                 </a:solidFill>
@@ -3673,12 +3772,115 @@
           <a:p>
             <a:pPr algn="ctr"/>
             <a:r>
-              <a:rPr lang="en-GB" dirty="0">
+              <a:rPr lang="en-GB" sz="1600" dirty="0">
                 <a:solidFill>
                   <a:schemeClr val="bg1"/>
                 </a:solidFill>
               </a:rPr>
-              <a:t>Another kind of moving obstacles, always moves slowly.</a:t>
+              <a:t>One kind of moving obstacle, always moves slowly.</a:t>
+            </a:r>
+          </a:p>
+        </p:txBody>
+      </p:sp>
+      <p:pic>
+        <p:nvPicPr>
+          <p:cNvPr id="3" name="Picture 2">
+            <a:extLst>
+              <a:ext uri="{FF2B5EF4-FFF2-40B4-BE49-F238E27FC236}">
+                <a16:creationId xmlns:a16="http://schemas.microsoft.com/office/drawing/2014/main" id="{CB862ADE-C5E2-49B9-9A3E-F5BC20B0B59E}"/>
+              </a:ext>
+            </a:extLst>
+          </p:cNvPr>
+          <p:cNvPicPr>
+            <a:picLocks noChangeAspect="1"/>
+          </p:cNvPicPr>
+          <p:nvPr/>
+        </p:nvPicPr>
+        <p:blipFill>
+          <a:blip r:embed="rId4">
+            <a:extLst>
+              <a:ext uri="{28A0092B-C50C-407E-A947-70E740481C1C}">
+                <a14:useLocalDpi xmlns:a14="http://schemas.microsoft.com/office/drawing/2010/main" val="0"/>
+              </a:ext>
+            </a:extLst>
+          </a:blip>
+          <a:stretch>
+            <a:fillRect/>
+          </a:stretch>
+        </p:blipFill>
+        <p:spPr>
+          <a:xfrm>
+            <a:off x="242814" y="2183229"/>
+            <a:ext cx="1270688" cy="858128"/>
+          </a:xfrm>
+          <a:prstGeom prst="rect">
+            <a:avLst/>
+          </a:prstGeom>
+        </p:spPr>
+      </p:pic>
+      <p:sp>
+        <p:nvSpPr>
+          <p:cNvPr id="12" name="TextBox 11">
+            <a:extLst>
+              <a:ext uri="{FF2B5EF4-FFF2-40B4-BE49-F238E27FC236}">
+                <a16:creationId xmlns:a16="http://schemas.microsoft.com/office/drawing/2014/main" id="{6087A286-C936-4873-A223-34437FD0A48C}"/>
+              </a:ext>
+            </a:extLst>
+          </p:cNvPr>
+          <p:cNvSpPr txBox="1"/>
+          <p:nvPr/>
+        </p:nvSpPr>
+        <p:spPr>
+          <a:xfrm>
+            <a:off x="1445453" y="2177385"/>
+            <a:ext cx="2161441" cy="1077218"/>
+          </a:xfrm>
+          <a:prstGeom prst="rect">
+            <a:avLst/>
+          </a:prstGeom>
+          <a:noFill/>
+        </p:spPr>
+        <p:txBody>
+          <a:bodyPr wrap="square" rtlCol="0">
+            <a:spAutoFit/>
+          </a:bodyPr>
+          <a:lstStyle/>
+          <a:p>
+            <a:pPr algn="ctr"/>
+            <a:r>
+              <a:rPr lang="en-GB" sz="1600" dirty="0">
+                <a:solidFill>
+                  <a:schemeClr val="bg1"/>
+                </a:solidFill>
+              </a:rPr>
+              <a:t>Snake: </a:t>
+            </a:r>
+          </a:p>
+          <a:p>
+            <a:pPr algn="ctr"/>
+            <a:r>
+              <a:rPr lang="en-GB" sz="1600" dirty="0">
+                <a:solidFill>
+                  <a:schemeClr val="bg1"/>
+                </a:solidFill>
+              </a:rPr>
+              <a:t>Another kind of moving obstacle, only appears </a:t>
+            </a:r>
+            <a:r>
+              <a:rPr lang="en-GB" sz="1600" dirty="0">
+                <a:solidFill>
+                  <a:srgbClr val="FF0000"/>
+                </a:solidFill>
+              </a:rPr>
+              <a:t>in middle lane</a:t>
+            </a:r>
+            <a:r>
+              <a:rPr lang="en-GB" sz="1600" dirty="0">
+                <a:solidFill>
+                  <a:schemeClr val="bg1"/>
+                </a:solidFill>
+              </a:rPr>
+              <a:t>.</a:t>
             </a:r>
           </a:p>
         </p:txBody>
@@ -3727,7 +3929,7 @@
         </p:nvSpPr>
         <p:spPr>
           <a:xfrm>
-            <a:off x="0" y="1"/>
+            <a:off x="0" y="0"/>
             <a:ext cx="12192000" cy="6858000"/>
           </a:xfrm>
           <a:prstGeom prst="rect">
@@ -3795,7 +3997,7 @@
         </p:blipFill>
         <p:spPr>
           <a:xfrm>
-            <a:off x="438149" y="117521"/>
+            <a:off x="249379" y="492561"/>
             <a:ext cx="1232388" cy="308097"/>
           </a:xfrm>
           <a:prstGeom prst="rect">
@@ -3817,8 +4019,8 @@
         </p:nvSpPr>
         <p:spPr>
           <a:xfrm>
-            <a:off x="0" y="425618"/>
-            <a:ext cx="2108687" cy="1200329"/>
+            <a:off x="1731145" y="89378"/>
+            <a:ext cx="2224097" cy="830997"/>
           </a:xfrm>
           <a:prstGeom prst="rect">
             <a:avLst/>
@@ -3833,7 +4035,7 @@
           <a:p>
             <a:pPr algn="ctr"/>
             <a:r>
-              <a:rPr lang="en-GB" dirty="0">
+              <a:rPr lang="en-GB" sz="1600" dirty="0">
                 <a:solidFill>
                   <a:schemeClr val="bg1"/>
                 </a:solidFill>
@@ -3844,7 +4046,7 @@
           <a:p>
             <a:pPr algn="ctr"/>
             <a:r>
-              <a:rPr lang="en-GB" dirty="0">
+              <a:rPr lang="en-GB" sz="1600" dirty="0">
                 <a:solidFill>
                   <a:schemeClr val="bg1"/>
                 </a:solidFill>
@@ -3882,7 +4084,7 @@
         </p:blipFill>
         <p:spPr>
           <a:xfrm>
-            <a:off x="510798" y="1625947"/>
+            <a:off x="322028" y="1249928"/>
             <a:ext cx="1087090" cy="418111"/>
           </a:xfrm>
           <a:prstGeom prst="rect">
@@ -3904,8 +4106,8 @@
         </p:nvSpPr>
         <p:spPr>
           <a:xfrm>
-            <a:off x="-1" y="2131326"/>
-            <a:ext cx="2108687" cy="1477328"/>
+            <a:off x="1731144" y="920375"/>
+            <a:ext cx="2224097" cy="1077218"/>
           </a:xfrm>
           <a:prstGeom prst="rect">
             <a:avLst/>
@@ -3920,7 +4122,7 @@
           <a:p>
             <a:pPr algn="ctr"/>
             <a:r>
-              <a:rPr lang="en-GB" dirty="0">
+              <a:rPr lang="en-GB" sz="1600" dirty="0">
                 <a:solidFill>
                   <a:schemeClr val="bg1"/>
                 </a:solidFill>
@@ -3931,7 +4133,7 @@
           <a:p>
             <a:pPr algn="ctr"/>
             <a:r>
-              <a:rPr lang="en-GB" dirty="0">
+              <a:rPr lang="en-GB" sz="1600" dirty="0">
                 <a:solidFill>
                   <a:schemeClr val="bg1"/>
                 </a:solidFill>
@@ -3939,7 +4141,7 @@
               <a:t>Another platform to help you cross the river, could be </a:t>
             </a:r>
             <a:r>
-              <a:rPr lang="en-GB" dirty="0">
+              <a:rPr lang="en-GB" sz="1600" dirty="0">
                 <a:solidFill>
                   <a:srgbClr val="FF0000"/>
                 </a:solidFill>
@@ -3947,7 +4149,7 @@
               <a:t>unreliable</a:t>
             </a:r>
             <a:r>
-              <a:rPr lang="en-GB" dirty="0">
+              <a:rPr lang="en-GB" sz="1600" dirty="0">
                 <a:solidFill>
                   <a:schemeClr val="bg1"/>
                 </a:solidFill>
@@ -3957,6 +4159,109 @@
           </a:p>
         </p:txBody>
       </p:sp>
+      <p:sp>
+        <p:nvSpPr>
+          <p:cNvPr id="8" name="TextBox 7">
+            <a:extLst>
+              <a:ext uri="{FF2B5EF4-FFF2-40B4-BE49-F238E27FC236}">
+                <a16:creationId xmlns:a16="http://schemas.microsoft.com/office/drawing/2014/main" id="{4E81771E-63CF-40F1-BE1D-A2F895CEE6F0}"/>
+              </a:ext>
+            </a:extLst>
+          </p:cNvPr>
+          <p:cNvSpPr txBox="1"/>
+          <p:nvPr/>
+        </p:nvSpPr>
+        <p:spPr>
+          <a:xfrm>
+            <a:off x="1731143" y="1997593"/>
+            <a:ext cx="2224097" cy="1323439"/>
+          </a:xfrm>
+          <a:prstGeom prst="rect">
+            <a:avLst/>
+          </a:prstGeom>
+          <a:noFill/>
+        </p:spPr>
+        <p:txBody>
+          <a:bodyPr wrap="square" rtlCol="0">
+            <a:spAutoFit/>
+          </a:bodyPr>
+          <a:lstStyle/>
+          <a:p>
+            <a:pPr algn="ctr"/>
+            <a:r>
+              <a:rPr lang="en-GB" sz="1600" dirty="0">
+                <a:solidFill>
+                  <a:schemeClr val="bg1"/>
+                </a:solidFill>
+              </a:rPr>
+              <a:t>Crocodile: </a:t>
+            </a:r>
+          </a:p>
+          <a:p>
+            <a:pPr algn="ctr"/>
+            <a:r>
+              <a:rPr lang="en-GB" sz="1600" dirty="0">
+                <a:solidFill>
+                  <a:schemeClr val="bg1"/>
+                </a:solidFill>
+              </a:rPr>
+              <a:t>Another platform to help you cross the river, dangerous when its </a:t>
+            </a:r>
+            <a:r>
+              <a:rPr lang="en-GB" sz="1600" dirty="0">
+                <a:solidFill>
+                  <a:srgbClr val="FF0000"/>
+                </a:solidFill>
+              </a:rPr>
+              <a:t>month is open</a:t>
+            </a:r>
+            <a:r>
+              <a:rPr lang="en-GB" sz="1600" dirty="0">
+                <a:solidFill>
+                  <a:schemeClr val="bg1"/>
+                </a:solidFill>
+              </a:rPr>
+              <a:t>.</a:t>
+            </a:r>
+          </a:p>
+        </p:txBody>
+      </p:sp>
+      <p:pic>
+        <p:nvPicPr>
+          <p:cNvPr id="3" name="Picture 2">
+            <a:extLst>
+              <a:ext uri="{FF2B5EF4-FFF2-40B4-BE49-F238E27FC236}">
+                <a16:creationId xmlns:a16="http://schemas.microsoft.com/office/drawing/2014/main" id="{274222AC-8E30-4AB9-B99E-46CF2AED8467}"/>
+              </a:ext>
+            </a:extLst>
+          </p:cNvPr>
+          <p:cNvPicPr>
+            <a:picLocks noChangeAspect="1"/>
+          </p:cNvPicPr>
+          <p:nvPr/>
+        </p:nvPicPr>
+        <p:blipFill>
+          <a:blip r:embed="rId4">
+            <a:extLst>
+              <a:ext uri="{28A0092B-C50C-407E-A947-70E740481C1C}">
+                <a14:useLocalDpi xmlns:a14="http://schemas.microsoft.com/office/drawing/2010/main" val="0"/>
+              </a:ext>
+            </a:extLst>
+          </a:blip>
+          <a:stretch>
+            <a:fillRect/>
+          </a:stretch>
+        </p:blipFill>
+        <p:spPr>
+          <a:xfrm>
+            <a:off x="249379" y="2435443"/>
+            <a:ext cx="1295581" cy="447737"/>
+          </a:xfrm>
+          <a:prstGeom prst="rect">
+            <a:avLst/>
+          </a:prstGeom>
+        </p:spPr>
+      </p:pic>
     </p:spTree>
     <p:extLst>
       <p:ext uri="{BB962C8B-B14F-4D97-AF65-F5344CB8AC3E}">
@@ -4069,8 +4374,8 @@
         </p:blipFill>
         <p:spPr>
           <a:xfrm>
-            <a:off x="214755" y="1725655"/>
-            <a:ext cx="609524" cy="609524"/>
+            <a:off x="260570" y="1411576"/>
+            <a:ext cx="442193" cy="442193"/>
           </a:xfrm>
           <a:prstGeom prst="rect">
             <a:avLst/>
@@ -4105,8 +4410,8 @@
         </p:blipFill>
         <p:spPr>
           <a:xfrm>
-            <a:off x="214755" y="175886"/>
-            <a:ext cx="609524" cy="609524"/>
+            <a:off x="253688" y="175886"/>
+            <a:ext cx="442193" cy="442193"/>
           </a:xfrm>
           <a:prstGeom prst="rect">
             <a:avLst/>
@@ -4141,8 +4446,8 @@
         </p:blipFill>
         <p:spPr>
           <a:xfrm>
-            <a:off x="214755" y="2474257"/>
-            <a:ext cx="581025" cy="628650"/>
+            <a:off x="260570" y="2109949"/>
+            <a:ext cx="421518" cy="456069"/>
           </a:xfrm>
           <a:prstGeom prst="rect">
             <a:avLst/>
@@ -4177,8 +4482,8 @@
         </p:blipFill>
         <p:spPr>
           <a:xfrm>
-            <a:off x="214755" y="961295"/>
-            <a:ext cx="590550" cy="590550"/>
+            <a:off x="260570" y="793964"/>
+            <a:ext cx="428428" cy="428428"/>
           </a:xfrm>
           <a:prstGeom prst="rect">
             <a:avLst/>
@@ -4200,7 +4505,7 @@
         <p:spPr>
           <a:xfrm>
             <a:off x="949568" y="175886"/>
-            <a:ext cx="2039817" cy="646331"/>
+            <a:ext cx="2039817" cy="584775"/>
           </a:xfrm>
           <a:prstGeom prst="rect">
             <a:avLst/>
@@ -4214,7 +4519,7 @@
           <a:lstStyle/>
           <a:p>
             <a:r>
-              <a:rPr lang="en-GB" dirty="0">
+              <a:rPr lang="en-GB" sz="1600" dirty="0">
                 <a:solidFill>
                   <a:schemeClr val="bg1"/>
                 </a:solidFill>
@@ -4224,7 +4529,7 @@
           </a:p>
           <a:p>
             <a:r>
-              <a:rPr lang="en-GB" dirty="0">
+              <a:rPr lang="en-GB" sz="1600" dirty="0">
                 <a:solidFill>
                   <a:schemeClr val="bg1"/>
                 </a:solidFill>
@@ -4248,8 +4553,8 @@
         </p:nvSpPr>
         <p:spPr>
           <a:xfrm>
-            <a:off x="930591" y="961295"/>
-            <a:ext cx="2039817" cy="646331"/>
+            <a:off x="930594" y="758086"/>
+            <a:ext cx="2039817" cy="584775"/>
           </a:xfrm>
           <a:prstGeom prst="rect">
             <a:avLst/>
@@ -4263,7 +4568,7 @@
           <a:lstStyle/>
           <a:p>
             <a:r>
-              <a:rPr lang="en-GB" dirty="0">
+              <a:rPr lang="en-GB" sz="1600" dirty="0">
                 <a:solidFill>
                   <a:schemeClr val="bg1"/>
                 </a:solidFill>
@@ -4273,7 +4578,7 @@
           </a:p>
           <a:p>
             <a:r>
-              <a:rPr lang="en-GB" dirty="0">
+              <a:rPr lang="en-GB" sz="1600" dirty="0">
                 <a:solidFill>
                   <a:schemeClr val="bg1"/>
                 </a:solidFill>
@@ -4297,8 +4602,8 @@
         </p:nvSpPr>
         <p:spPr>
           <a:xfrm>
-            <a:off x="949566" y="1688848"/>
-            <a:ext cx="2233249" cy="646331"/>
+            <a:off x="930594" y="1340286"/>
+            <a:ext cx="2233249" cy="584775"/>
           </a:xfrm>
           <a:prstGeom prst="rect">
             <a:avLst/>
@@ -4312,7 +4617,7 @@
           <a:lstStyle/>
           <a:p>
             <a:r>
-              <a:rPr lang="en-GB" dirty="0">
+              <a:rPr lang="en-GB" sz="1600" dirty="0">
                 <a:solidFill>
                   <a:schemeClr val="bg1"/>
                 </a:solidFill>
@@ -4322,7 +4627,7 @@
           </a:p>
           <a:p>
             <a:r>
-              <a:rPr lang="en-GB" dirty="0">
+              <a:rPr lang="en-GB" sz="1600" dirty="0">
                 <a:solidFill>
                   <a:schemeClr val="bg1"/>
                 </a:solidFill>
@@ -4346,8 +4651,8 @@
         </p:nvSpPr>
         <p:spPr>
           <a:xfrm>
-            <a:off x="949567" y="2380823"/>
-            <a:ext cx="2233248" cy="923330"/>
+            <a:off x="949568" y="1922486"/>
+            <a:ext cx="2148740" cy="830997"/>
           </a:xfrm>
           <a:prstGeom prst="rect">
             <a:avLst/>
@@ -4361,7 +4666,7 @@
           <a:lstStyle/>
           <a:p>
             <a:r>
-              <a:rPr lang="en-GB" dirty="0">
+              <a:rPr lang="en-GB" sz="1600" dirty="0">
                 <a:solidFill>
                   <a:schemeClr val="bg1"/>
                 </a:solidFill>
@@ -4371,7 +4676,7 @@
           </a:p>
           <a:p>
             <a:r>
-              <a:rPr lang="en-GB" dirty="0">
+              <a:rPr lang="en-GB" sz="1600" dirty="0">
                 <a:solidFill>
                   <a:schemeClr val="bg1"/>
                 </a:solidFill>

</xml_diff>